<commit_message>
adding Monday class material
</commit_message>
<xml_diff>
--- a/presentations/Day1_Rbasics.pptx
+++ b/presentations/Day1_Rbasics.pptx
@@ -26,11 +26,11 @@
     <p:sldId id="291" r:id="rId17"/>
     <p:sldId id="332" r:id="rId18"/>
     <p:sldId id="333" r:id="rId19"/>
-    <p:sldId id="335" r:id="rId20"/>
-    <p:sldId id="338" r:id="rId21"/>
-    <p:sldId id="336" r:id="rId22"/>
-    <p:sldId id="343" r:id="rId23"/>
-    <p:sldId id="337" r:id="rId24"/>
+    <p:sldId id="336" r:id="rId20"/>
+    <p:sldId id="343" r:id="rId21"/>
+    <p:sldId id="337" r:id="rId22"/>
+    <p:sldId id="346" r:id="rId23"/>
+    <p:sldId id="347" r:id="rId24"/>
   </p:sldIdLst>
   <p:sldSz cx="9144000" cy="6858000" type="screen4x3"/>
   <p:notesSz cx="6858000" cy="9144000"/>
@@ -266,7 +266,7 @@
               <a:pPr>
                 <a:defRPr/>
               </a:pPr>
-              <a:t>11/11/21</a:t>
+              <a:t>11/12/21</a:t>
             </a:fld>
             <a:endParaRPr lang="en-US"/>
           </a:p>
@@ -999,7 +999,7 @@
               <a:pPr>
                 <a:defRPr/>
               </a:pPr>
-              <a:t>11/11/21</a:t>
+              <a:t>11/12/21</a:t>
             </a:fld>
             <a:endParaRPr lang="en-US"/>
           </a:p>
@@ -1776,7 +1776,7 @@
               <a:pPr>
                 <a:defRPr/>
               </a:pPr>
-              <a:t>11/11/21</a:t>
+              <a:t>11/12/21</a:t>
             </a:fld>
             <a:endParaRPr lang="en-US"/>
           </a:p>
@@ -2420,7 +2420,7 @@
               <a:pPr>
                 <a:defRPr/>
               </a:pPr>
-              <a:t>11/11/21</a:t>
+              <a:t>11/12/21</a:t>
             </a:fld>
             <a:endParaRPr lang="en-US"/>
           </a:p>
@@ -2863,7 +2863,7 @@
               <a:pPr>
                 <a:defRPr/>
               </a:pPr>
-              <a:t>11/11/21</a:t>
+              <a:t>11/12/21</a:t>
             </a:fld>
             <a:endParaRPr lang="en-US"/>
           </a:p>
@@ -3060,7 +3060,7 @@
               <a:pPr>
                 <a:defRPr/>
               </a:pPr>
-              <a:t>11/11/21</a:t>
+              <a:t>11/12/21</a:t>
             </a:fld>
             <a:endParaRPr lang="en-US"/>
           </a:p>
@@ -3897,7 +3897,7 @@
               <a:pPr>
                 <a:defRPr/>
               </a:pPr>
-              <a:t>11/11/21</a:t>
+              <a:t>11/12/21</a:t>
             </a:fld>
             <a:endParaRPr lang="en-US"/>
           </a:p>
@@ -4428,7 +4428,7 @@
               <a:pPr>
                 <a:defRPr/>
               </a:pPr>
-              <a:t>11/11/21</a:t>
+              <a:t>11/12/21</a:t>
             </a:fld>
             <a:endParaRPr lang="en-US"/>
           </a:p>
@@ -4681,7 +4681,7 @@
               <a:pPr>
                 <a:defRPr/>
               </a:pPr>
-              <a:t>11/11/21</a:t>
+              <a:t>11/12/21</a:t>
             </a:fld>
             <a:endParaRPr lang="en-US"/>
           </a:p>
@@ -5226,7 +5226,7 @@
               <a:pPr>
                 <a:defRPr/>
               </a:pPr>
-              <a:t>11/11/21</a:t>
+              <a:t>11/12/21</a:t>
             </a:fld>
             <a:endParaRPr lang="en-US"/>
           </a:p>
@@ -5381,7 +5381,7 @@
               <a:pPr>
                 <a:defRPr/>
               </a:pPr>
-              <a:t>11/11/21</a:t>
+              <a:t>11/12/21</a:t>
             </a:fld>
             <a:endParaRPr lang="en-US"/>
           </a:p>
@@ -6299,7 +6299,7 @@
               <a:pPr>
                 <a:defRPr/>
               </a:pPr>
-              <a:t>11/11/21</a:t>
+              <a:t>11/12/21</a:t>
             </a:fld>
             <a:endParaRPr lang="en-US"/>
           </a:p>
@@ -6442,7 +6442,7 @@
               <a:pPr>
                 <a:defRPr/>
               </a:pPr>
-              <a:t>11/11/21</a:t>
+              <a:t>11/12/21</a:t>
             </a:fld>
             <a:endParaRPr lang="en-US"/>
           </a:p>
@@ -7346,7 +7346,7 @@
               <a:pPr>
                 <a:defRPr/>
               </a:pPr>
-              <a:t>11/11/21</a:t>
+              <a:t>11/12/21</a:t>
             </a:fld>
             <a:endParaRPr lang="en-US"/>
           </a:p>
@@ -8014,7 +8014,7 @@
               <a:pPr>
                 <a:defRPr/>
               </a:pPr>
-              <a:t>11/11/21</a:t>
+              <a:t>11/12/21</a:t>
             </a:fld>
             <a:endParaRPr lang="en-US"/>
           </a:p>
@@ -8350,7 +8350,7 @@
               <a:pPr>
                 <a:defRPr/>
               </a:pPr>
-              <a:t>11/11/21</a:t>
+              <a:t>11/12/21</a:t>
             </a:fld>
             <a:endParaRPr lang="en-US"/>
           </a:p>
@@ -8460,7 +8460,7 @@
               <a:pPr>
                 <a:defRPr/>
               </a:pPr>
-              <a:t>11/11/21</a:t>
+              <a:t>11/12/21</a:t>
             </a:fld>
             <a:endParaRPr lang="en-US"/>
           </a:p>
@@ -8808,7 +8808,7 @@
               <a:pPr>
                 <a:defRPr/>
               </a:pPr>
-              <a:t>11/11/21</a:t>
+              <a:t>11/12/21</a:t>
             </a:fld>
             <a:endParaRPr lang="en-US"/>
           </a:p>
@@ -10705,7 +10705,7 @@
         <p:spPr bwMode="auto">
           <a:xfrm>
             <a:off x="0" y="990600"/>
-            <a:ext cx="5867400" cy="523220"/>
+            <a:ext cx="8382000" cy="523220"/>
           </a:xfrm>
           <a:prstGeom prst="rect">
             <a:avLst/>
@@ -10770,6 +10770,28 @@
                 </a:solidFill>
               </a:rPr>
               <a:t>ecology</a:t>
+            </a:r>
+            <a:r>
+              <a:rPr lang="es-ES_tradnl" sz="2800" dirty="0">
+                <a:solidFill>
+                  <a:schemeClr val="tx1">
+                    <a:lumMod val="75000"/>
+                    <a:lumOff val="25000"/>
+                  </a:schemeClr>
+                </a:solidFill>
+              </a:rPr>
+              <a:t>/</a:t>
+            </a:r>
+            <a:r>
+              <a:rPr lang="es-ES_tradnl" sz="2800" dirty="0" err="1">
+                <a:solidFill>
+                  <a:schemeClr val="tx1">
+                    <a:lumMod val="75000"/>
+                    <a:lumOff val="25000"/>
+                  </a:schemeClr>
+                </a:solidFill>
+              </a:rPr>
+              <a:t>epidemiology</a:t>
             </a:r>
             <a:endParaRPr lang="es-ES_tradnl" sz="2800" dirty="0">
               <a:solidFill>
@@ -12533,8 +12555,8 @@
         </p:nvSpPr>
         <p:spPr bwMode="auto">
           <a:xfrm>
-            <a:off x="341313" y="1739140"/>
-            <a:ext cx="3886200" cy="5262979"/>
+            <a:off x="693295" y="1676400"/>
+            <a:ext cx="3886200" cy="830997"/>
           </a:xfrm>
           <a:prstGeom prst="rect">
             <a:avLst/>
@@ -12557,70 +12579,6 @@
               <a:buFont typeface="Arial" charset="0"/>
               <a:buChar char="•"/>
             </a:pPr>
-            <a:r>
-              <a:rPr lang="en-US" sz="2400" dirty="0">
-                <a:solidFill>
-                  <a:srgbClr val="404040"/>
-                </a:solidFill>
-              </a:rPr>
-              <a:t>Most of the time have a data book where you write down your data, observations, etc.</a:t>
-            </a:r>
-          </a:p>
-          <a:p>
-            <a:pPr marL="342900" indent="-342900">
-              <a:buFont typeface="Arial" charset="0"/>
-              <a:buChar char="•"/>
-            </a:pPr>
-            <a:endParaRPr lang="en-US" sz="2400" dirty="0">
-              <a:solidFill>
-                <a:srgbClr val="404040"/>
-              </a:solidFill>
-            </a:endParaRPr>
-          </a:p>
-          <a:p>
-            <a:pPr marL="342900" indent="-342900">
-              <a:buFont typeface="Arial" charset="0"/>
-              <a:buChar char="•"/>
-            </a:pPr>
-            <a:r>
-              <a:rPr lang="en-US" sz="2400" dirty="0">
-                <a:solidFill>
-                  <a:srgbClr val="404040"/>
-                </a:solidFill>
-              </a:rPr>
-              <a:t>Most people use MS Excel to enter and store data from the notebook on the computer.</a:t>
-            </a:r>
-          </a:p>
-          <a:p>
-            <a:pPr marL="342900" indent="-342900">
-              <a:buFont typeface="Arial" charset="0"/>
-              <a:buChar char="•"/>
-            </a:pPr>
-            <a:endParaRPr lang="en-US" sz="2400" dirty="0">
-              <a:solidFill>
-                <a:srgbClr val="404040"/>
-              </a:solidFill>
-            </a:endParaRPr>
-          </a:p>
-          <a:p>
-            <a:pPr marL="342900" indent="-342900">
-              <a:buFont typeface="Arial" charset="0"/>
-              <a:buChar char="•"/>
-            </a:pPr>
-            <a:r>
-              <a:rPr lang="en-US" sz="2400" b="1" dirty="0">
-                <a:solidFill>
-                  <a:srgbClr val="FF0000"/>
-                </a:solidFill>
-              </a:rPr>
-              <a:t>But… BEWARE of how data is recorded on excel</a:t>
-            </a:r>
-          </a:p>
-          <a:p>
-            <a:pPr marL="342900" indent="-342900">
-              <a:buFont typeface="Arial" charset="0"/>
-              <a:buChar char="•"/>
-            </a:pPr>
             <a:endParaRPr lang="en-US" sz="2400" dirty="0">
               <a:solidFill>
                 <a:srgbClr val="404040"/>
@@ -12648,7 +12606,7 @@
         <p:spPr bwMode="auto">
           <a:xfrm>
             <a:off x="341313" y="444500"/>
-            <a:ext cx="3453702" cy="646331"/>
+            <a:ext cx="6154121" cy="646331"/>
           </a:xfrm>
           <a:prstGeom prst="rect">
             <a:avLst/>
@@ -12673,17 +12631,17 @@
                   <a:srgbClr val="E46C0A"/>
                 </a:solidFill>
               </a:rPr>
-              <a:t>Record your data</a:t>
-            </a:r>
-          </a:p>
-        </p:txBody>
-      </p:sp>
-      <p:sp>
-        <p:nvSpPr>
-          <p:cNvPr id="7" name="TextBox 6">
+              <a:t>Record your data: general rules</a:t>
+            </a:r>
+          </a:p>
+        </p:txBody>
+      </p:sp>
+      <p:sp>
+        <p:nvSpPr>
+          <p:cNvPr id="2" name="TextBox 1">
             <a:extLst>
               <a:ext uri="{FF2B5EF4-FFF2-40B4-BE49-F238E27FC236}">
-                <a16:creationId xmlns:a16="http://schemas.microsoft.com/office/drawing/2014/main" id="{F4FCCA24-69A0-7F4D-9D80-6A79FD19AC30}"/>
+                <a16:creationId xmlns:a16="http://schemas.microsoft.com/office/drawing/2014/main" id="{513D88A1-2ABD-554A-9EEE-851EA8A19B2B}"/>
               </a:ext>
             </a:extLst>
           </p:cNvPr>
@@ -12692,8 +12650,8 @@
         </p:nvSpPr>
         <p:spPr>
           <a:xfrm>
-            <a:off x="4510206" y="1277475"/>
-            <a:ext cx="4264999" cy="923330"/>
+            <a:off x="457200" y="1090831"/>
+            <a:ext cx="4800600" cy="2246769"/>
           </a:xfrm>
           <a:prstGeom prst="rect">
             <a:avLst/>
@@ -12706,31 +12664,43 @@
           </a:bodyPr>
           <a:lstStyle/>
           <a:p>
-            <a:r>
-              <a:rPr lang="en-US" i="1" dirty="0"/>
-              <a:t>Hypothetical data on sizes of trees in deer </a:t>
-            </a:r>
-            <a:r>
-              <a:rPr lang="en-US" i="1" dirty="0" err="1"/>
-              <a:t>exclosures</a:t>
-            </a:r>
-            <a:r>
-              <a:rPr lang="en-US" i="1" dirty="0"/>
-              <a:t> </a:t>
-            </a:r>
-            <a:endParaRPr lang="en-US" dirty="0"/>
-          </a:p>
-          <a:p>
-            <a:endParaRPr lang="en-US" dirty="0"/>
+            <a:pPr marL="285750" indent="-285750">
+              <a:buFont typeface="Arial" panose="020B0604020202020204" pitchFamily="34" charset="0"/>
+              <a:buChar char="•"/>
+            </a:pPr>
+            <a:r>
+              <a:rPr lang="en-US" sz="2800" dirty="0"/>
+              <a:t>Avoid spaces: use period “.” or underscore “_”.</a:t>
+            </a:r>
+          </a:p>
+          <a:p>
+            <a:pPr marL="285750" indent="-285750">
+              <a:buFont typeface="Arial" panose="020B0604020202020204" pitchFamily="34" charset="0"/>
+              <a:buChar char="•"/>
+            </a:pPr>
+            <a:r>
+              <a:rPr lang="en-US" sz="2800" dirty="0"/>
+              <a:t>Keep column names short, simple and unique.</a:t>
+            </a:r>
+          </a:p>
+          <a:p>
+            <a:pPr marL="285750" indent="-285750">
+              <a:buFont typeface="Arial" panose="020B0604020202020204" pitchFamily="34" charset="0"/>
+              <a:buChar char="•"/>
+            </a:pPr>
+            <a:r>
+              <a:rPr lang="en-US" sz="2800" b="1" dirty="0"/>
+              <a:t>Be very careful of typos.</a:t>
+            </a:r>
           </a:p>
         </p:txBody>
       </p:sp>
       <p:pic>
         <p:nvPicPr>
-          <p:cNvPr id="9" name="Picture 8">
+          <p:cNvPr id="7" name="Picture 6">
             <a:extLst>
               <a:ext uri="{FF2B5EF4-FFF2-40B4-BE49-F238E27FC236}">
-                <a16:creationId xmlns:a16="http://schemas.microsoft.com/office/drawing/2014/main" id="{7CB95A5C-5152-E84F-BD4E-2D8CB0652E81}"/>
+                <a16:creationId xmlns:a16="http://schemas.microsoft.com/office/drawing/2014/main" id="{E10FA89D-DEA6-AB43-83B0-1305B876D959}"/>
               </a:ext>
             </a:extLst>
           </p:cNvPr>
@@ -12753,8 +12723,8 @@
         </p:blipFill>
         <p:spPr>
           <a:xfrm>
-            <a:off x="4889007" y="2438400"/>
-            <a:ext cx="3401258" cy="3429000"/>
+            <a:off x="4876800" y="4153764"/>
+            <a:ext cx="4114800" cy="2243610"/>
           </a:xfrm>
           <a:prstGeom prst="rect">
             <a:avLst/>
@@ -12764,7 +12734,7 @@
     </p:spTree>
     <p:extLst>
       <p:ext uri="{BB962C8B-B14F-4D97-AF65-F5344CB8AC3E}">
-        <p14:creationId xmlns:p14="http://schemas.microsoft.com/office/powerpoint/2010/main" val="117405431"/>
+        <p14:creationId xmlns:p14="http://schemas.microsoft.com/office/powerpoint/2010/main" val="2044767919"/>
       </p:ext>
     </p:extLst>
   </p:cSld>
@@ -12857,7 +12827,7 @@
         </p:blipFill>
         <p:spPr>
           <a:xfrm>
-            <a:off x="6096000" y="1752600"/>
+            <a:off x="3962400" y="1905000"/>
             <a:ext cx="2286000" cy="4837190"/>
           </a:xfrm>
         </p:spPr>
@@ -12932,490 +12902,6 @@
         </p:nvSpPr>
         <p:spPr bwMode="auto">
           <a:xfrm>
-            <a:off x="341313" y="1739140"/>
-            <a:ext cx="3886200" cy="5262979"/>
-          </a:xfrm>
-          <a:prstGeom prst="rect">
-            <a:avLst/>
-          </a:prstGeom>
-          <a:noFill/>
-          <a:ln w="9525">
-            <a:noFill/>
-            <a:miter lim="800000"/>
-            <a:headEnd/>
-            <a:tailEnd/>
-          </a:ln>
-        </p:spPr>
-        <p:txBody>
-          <a:bodyPr wrap="square">
-            <a:spAutoFit/>
-          </a:bodyPr>
-          <a:lstStyle/>
-          <a:p>
-            <a:pPr marL="342900" indent="-342900">
-              <a:buFont typeface="Arial" charset="0"/>
-              <a:buChar char="•"/>
-            </a:pPr>
-            <a:r>
-              <a:rPr lang="en-US" sz="2400" dirty="0">
-                <a:solidFill>
-                  <a:srgbClr val="404040"/>
-                </a:solidFill>
-              </a:rPr>
-              <a:t>Most of the time have a data book where you write down your data, observations, etc.</a:t>
-            </a:r>
-          </a:p>
-          <a:p>
-            <a:pPr marL="342900" indent="-342900">
-              <a:buFont typeface="Arial" charset="0"/>
-              <a:buChar char="•"/>
-            </a:pPr>
-            <a:endParaRPr lang="en-US" sz="2400" dirty="0">
-              <a:solidFill>
-                <a:srgbClr val="404040"/>
-              </a:solidFill>
-            </a:endParaRPr>
-          </a:p>
-          <a:p>
-            <a:pPr marL="342900" indent="-342900">
-              <a:buFont typeface="Arial" charset="0"/>
-              <a:buChar char="•"/>
-            </a:pPr>
-            <a:r>
-              <a:rPr lang="en-US" sz="2400" dirty="0">
-                <a:solidFill>
-                  <a:srgbClr val="404040"/>
-                </a:solidFill>
-              </a:rPr>
-              <a:t>Most people use MS Excel to enter and store data from the notebook on the computer.</a:t>
-            </a:r>
-          </a:p>
-          <a:p>
-            <a:pPr marL="342900" indent="-342900">
-              <a:buFont typeface="Arial" charset="0"/>
-              <a:buChar char="•"/>
-            </a:pPr>
-            <a:endParaRPr lang="en-US" sz="2400" dirty="0">
-              <a:solidFill>
-                <a:srgbClr val="404040"/>
-              </a:solidFill>
-            </a:endParaRPr>
-          </a:p>
-          <a:p>
-            <a:pPr marL="342900" indent="-342900">
-              <a:buFont typeface="Arial" charset="0"/>
-              <a:buChar char="•"/>
-            </a:pPr>
-            <a:r>
-              <a:rPr lang="en-US" sz="2400" b="1" dirty="0">
-                <a:solidFill>
-                  <a:srgbClr val="FF0000"/>
-                </a:solidFill>
-              </a:rPr>
-              <a:t>But… BEWARE of how data is recorded on excel</a:t>
-            </a:r>
-          </a:p>
-          <a:p>
-            <a:pPr marL="342900" indent="-342900">
-              <a:buFont typeface="Arial" charset="0"/>
-              <a:buChar char="•"/>
-            </a:pPr>
-            <a:endParaRPr lang="en-US" sz="2400" dirty="0">
-              <a:solidFill>
-                <a:srgbClr val="404040"/>
-              </a:solidFill>
-            </a:endParaRPr>
-          </a:p>
-          <a:p>
-            <a:pPr marL="342900" indent="-342900"/>
-            <a:endParaRPr lang="en-US" sz="2400" dirty="0">
-              <a:solidFill>
-                <a:srgbClr val="404040"/>
-              </a:solidFill>
-            </a:endParaRPr>
-          </a:p>
-        </p:txBody>
-      </p:sp>
-      <p:sp>
-        <p:nvSpPr>
-          <p:cNvPr id="17410" name="Rectangle 3"/>
-          <p:cNvSpPr>
-            <a:spLocks noChangeArrowheads="1"/>
-          </p:cNvSpPr>
-          <p:nvPr/>
-        </p:nvSpPr>
-        <p:spPr bwMode="auto">
-          <a:xfrm>
-            <a:off x="341313" y="444500"/>
-            <a:ext cx="3453702" cy="646331"/>
-          </a:xfrm>
-          <a:prstGeom prst="rect">
-            <a:avLst/>
-          </a:prstGeom>
-          <a:noFill/>
-          <a:ln w="9525">
-            <a:noFill/>
-            <a:miter lim="800000"/>
-            <a:headEnd/>
-            <a:tailEnd/>
-          </a:ln>
-        </p:spPr>
-        <p:txBody>
-          <a:bodyPr wrap="none">
-            <a:spAutoFit/>
-          </a:bodyPr>
-          <a:lstStyle/>
-          <a:p>
-            <a:r>
-              <a:rPr lang="en-US" sz="3600" b="1" dirty="0">
-                <a:solidFill>
-                  <a:srgbClr val="E46C0A"/>
-                </a:solidFill>
-              </a:rPr>
-              <a:t>Record your data</a:t>
-            </a:r>
-          </a:p>
-        </p:txBody>
-      </p:sp>
-      <p:pic>
-        <p:nvPicPr>
-          <p:cNvPr id="6" name="Picture 5">
-            <a:extLst>
-              <a:ext uri="{FF2B5EF4-FFF2-40B4-BE49-F238E27FC236}">
-                <a16:creationId xmlns:a16="http://schemas.microsoft.com/office/drawing/2014/main" id="{3A4F3D22-52B1-DB47-9BE5-9DA24EF06E15}"/>
-              </a:ext>
-            </a:extLst>
-          </p:cNvPr>
-          <p:cNvPicPr>
-            <a:picLocks noChangeAspect="1"/>
-          </p:cNvPicPr>
-          <p:nvPr/>
-        </p:nvPicPr>
-        <p:blipFill>
-          <a:blip r:embed="rId2" cstate="screen">
-            <a:extLst>
-              <a:ext uri="{28A0092B-C50C-407E-A947-70E740481C1C}">
-                <a14:useLocalDpi xmlns:a14="http://schemas.microsoft.com/office/drawing/2010/main"/>
-              </a:ext>
-            </a:extLst>
-          </a:blip>
-          <a:stretch>
-            <a:fillRect/>
-          </a:stretch>
-        </p:blipFill>
-        <p:spPr>
-          <a:xfrm>
-            <a:off x="4234039" y="2895600"/>
-            <a:ext cx="4568648" cy="3581400"/>
-          </a:xfrm>
-          <a:prstGeom prst="rect">
-            <a:avLst/>
-          </a:prstGeom>
-        </p:spPr>
-      </p:pic>
-      <p:sp>
-        <p:nvSpPr>
-          <p:cNvPr id="7" name="TextBox 6">
-            <a:extLst>
-              <a:ext uri="{FF2B5EF4-FFF2-40B4-BE49-F238E27FC236}">
-                <a16:creationId xmlns:a16="http://schemas.microsoft.com/office/drawing/2014/main" id="{F4FCCA24-69A0-7F4D-9D80-6A79FD19AC30}"/>
-              </a:ext>
-            </a:extLst>
-          </p:cNvPr>
-          <p:cNvSpPr txBox="1"/>
-          <p:nvPr/>
-        </p:nvSpPr>
-        <p:spPr>
-          <a:xfrm>
-            <a:off x="4510206" y="1277475"/>
-            <a:ext cx="4264999" cy="923330"/>
-          </a:xfrm>
-          <a:prstGeom prst="rect">
-            <a:avLst/>
-          </a:prstGeom>
-          <a:noFill/>
-        </p:spPr>
-        <p:txBody>
-          <a:bodyPr wrap="square" rtlCol="0">
-            <a:spAutoFit/>
-          </a:bodyPr>
-          <a:lstStyle/>
-          <a:p>
-            <a:r>
-              <a:rPr lang="en-US" i="1" dirty="0"/>
-              <a:t>Hypothetical data on sizes of trees in deer </a:t>
-            </a:r>
-            <a:r>
-              <a:rPr lang="en-US" i="1" dirty="0" err="1"/>
-              <a:t>exclosures</a:t>
-            </a:r>
-            <a:r>
-              <a:rPr lang="en-US" i="1" dirty="0"/>
-              <a:t> </a:t>
-            </a:r>
-            <a:endParaRPr lang="en-US" dirty="0"/>
-          </a:p>
-          <a:p>
-            <a:endParaRPr lang="en-US" dirty="0"/>
-          </a:p>
-        </p:txBody>
-      </p:sp>
-    </p:spTree>
-    <p:extLst>
-      <p:ext uri="{BB962C8B-B14F-4D97-AF65-F5344CB8AC3E}">
-        <p14:creationId xmlns:p14="http://schemas.microsoft.com/office/powerpoint/2010/main" val="1996602100"/>
-      </p:ext>
-    </p:extLst>
-  </p:cSld>
-  <p:clrMapOvr>
-    <a:masterClrMapping/>
-  </p:clrMapOvr>
-</p:sld>
-</file>
-
-<file path=ppt/slides/slide21.xml><?xml version="1.0" encoding="utf-8"?>
-<p:sld xmlns:a="http://schemas.openxmlformats.org/drawingml/2006/main" xmlns:r="http://schemas.openxmlformats.org/officeDocument/2006/relationships" xmlns:p="http://schemas.openxmlformats.org/presentationml/2006/main">
-  <p:cSld>
-    <p:spTree>
-      <p:nvGrpSpPr>
-        <p:cNvPr id="1" name=""/>
-        <p:cNvGrpSpPr/>
-        <p:nvPr/>
-      </p:nvGrpSpPr>
-      <p:grpSpPr>
-        <a:xfrm>
-          <a:off x="0" y="0"/>
-          <a:ext cx="0" cy="0"/>
-          <a:chOff x="0" y="0"/>
-          <a:chExt cx="0" cy="0"/>
-        </a:xfrm>
-      </p:grpSpPr>
-      <p:sp>
-        <p:nvSpPr>
-          <p:cNvPr id="17409" name="Rectangle 9"/>
-          <p:cNvSpPr>
-            <a:spLocks noChangeArrowheads="1"/>
-          </p:cNvSpPr>
-          <p:nvPr/>
-        </p:nvSpPr>
-        <p:spPr bwMode="auto">
-          <a:xfrm>
-            <a:off x="693295" y="1676400"/>
-            <a:ext cx="3886200" cy="830997"/>
-          </a:xfrm>
-          <a:prstGeom prst="rect">
-            <a:avLst/>
-          </a:prstGeom>
-          <a:noFill/>
-          <a:ln w="9525">
-            <a:noFill/>
-            <a:miter lim="800000"/>
-            <a:headEnd/>
-            <a:tailEnd/>
-          </a:ln>
-        </p:spPr>
-        <p:txBody>
-          <a:bodyPr wrap="square">
-            <a:spAutoFit/>
-          </a:bodyPr>
-          <a:lstStyle/>
-          <a:p>
-            <a:pPr marL="342900" indent="-342900">
-              <a:buFont typeface="Arial" charset="0"/>
-              <a:buChar char="•"/>
-            </a:pPr>
-            <a:endParaRPr lang="en-US" sz="2400" dirty="0">
-              <a:solidFill>
-                <a:srgbClr val="404040"/>
-              </a:solidFill>
-            </a:endParaRPr>
-          </a:p>
-          <a:p>
-            <a:pPr marL="342900" indent="-342900"/>
-            <a:endParaRPr lang="en-US" sz="2400" dirty="0">
-              <a:solidFill>
-                <a:srgbClr val="404040"/>
-              </a:solidFill>
-            </a:endParaRPr>
-          </a:p>
-        </p:txBody>
-      </p:sp>
-      <p:sp>
-        <p:nvSpPr>
-          <p:cNvPr id="17410" name="Rectangle 3"/>
-          <p:cNvSpPr>
-            <a:spLocks noChangeArrowheads="1"/>
-          </p:cNvSpPr>
-          <p:nvPr/>
-        </p:nvSpPr>
-        <p:spPr bwMode="auto">
-          <a:xfrm>
-            <a:off x="341313" y="444500"/>
-            <a:ext cx="6154121" cy="646331"/>
-          </a:xfrm>
-          <a:prstGeom prst="rect">
-            <a:avLst/>
-          </a:prstGeom>
-          <a:noFill/>
-          <a:ln w="9525">
-            <a:noFill/>
-            <a:miter lim="800000"/>
-            <a:headEnd/>
-            <a:tailEnd/>
-          </a:ln>
-        </p:spPr>
-        <p:txBody>
-          <a:bodyPr wrap="none">
-            <a:spAutoFit/>
-          </a:bodyPr>
-          <a:lstStyle/>
-          <a:p>
-            <a:r>
-              <a:rPr lang="en-US" sz="3600" b="1" dirty="0">
-                <a:solidFill>
-                  <a:srgbClr val="E46C0A"/>
-                </a:solidFill>
-              </a:rPr>
-              <a:t>Record your data: general rules</a:t>
-            </a:r>
-          </a:p>
-        </p:txBody>
-      </p:sp>
-      <p:sp>
-        <p:nvSpPr>
-          <p:cNvPr id="2" name="TextBox 1">
-            <a:extLst>
-              <a:ext uri="{FF2B5EF4-FFF2-40B4-BE49-F238E27FC236}">
-                <a16:creationId xmlns:a16="http://schemas.microsoft.com/office/drawing/2014/main" id="{513D88A1-2ABD-554A-9EEE-851EA8A19B2B}"/>
-              </a:ext>
-            </a:extLst>
-          </p:cNvPr>
-          <p:cNvSpPr txBox="1"/>
-          <p:nvPr/>
-        </p:nvSpPr>
-        <p:spPr>
-          <a:xfrm>
-            <a:off x="457200" y="1090831"/>
-            <a:ext cx="4800600" cy="2246769"/>
-          </a:xfrm>
-          <a:prstGeom prst="rect">
-            <a:avLst/>
-          </a:prstGeom>
-          <a:noFill/>
-        </p:spPr>
-        <p:txBody>
-          <a:bodyPr wrap="square" rtlCol="0">
-            <a:spAutoFit/>
-          </a:bodyPr>
-          <a:lstStyle/>
-          <a:p>
-            <a:pPr marL="285750" indent="-285750">
-              <a:buFont typeface="Arial" panose="020B0604020202020204" pitchFamily="34" charset="0"/>
-              <a:buChar char="•"/>
-            </a:pPr>
-            <a:r>
-              <a:rPr lang="en-US" sz="2800" dirty="0"/>
-              <a:t>Avoid spaces: use period “.” or underscore “_”.</a:t>
-            </a:r>
-          </a:p>
-          <a:p>
-            <a:pPr marL="285750" indent="-285750">
-              <a:buFont typeface="Arial" panose="020B0604020202020204" pitchFamily="34" charset="0"/>
-              <a:buChar char="•"/>
-            </a:pPr>
-            <a:r>
-              <a:rPr lang="en-US" sz="2800" dirty="0"/>
-              <a:t>Keep column names short, simple and unique.</a:t>
-            </a:r>
-          </a:p>
-          <a:p>
-            <a:pPr marL="285750" indent="-285750">
-              <a:buFont typeface="Arial" panose="020B0604020202020204" pitchFamily="34" charset="0"/>
-              <a:buChar char="•"/>
-            </a:pPr>
-            <a:r>
-              <a:rPr lang="en-US" sz="2800" b="1" dirty="0"/>
-              <a:t>Be very careful of typos.</a:t>
-            </a:r>
-          </a:p>
-        </p:txBody>
-      </p:sp>
-      <p:pic>
-        <p:nvPicPr>
-          <p:cNvPr id="7" name="Picture 6">
-            <a:extLst>
-              <a:ext uri="{FF2B5EF4-FFF2-40B4-BE49-F238E27FC236}">
-                <a16:creationId xmlns:a16="http://schemas.microsoft.com/office/drawing/2014/main" id="{E10FA89D-DEA6-AB43-83B0-1305B876D959}"/>
-              </a:ext>
-            </a:extLst>
-          </p:cNvPr>
-          <p:cNvPicPr>
-            <a:picLocks noChangeAspect="1"/>
-          </p:cNvPicPr>
-          <p:nvPr/>
-        </p:nvPicPr>
-        <p:blipFill>
-          <a:blip r:embed="rId2" cstate="screen">
-            <a:extLst>
-              <a:ext uri="{28A0092B-C50C-407E-A947-70E740481C1C}">
-                <a14:useLocalDpi xmlns:a14="http://schemas.microsoft.com/office/drawing/2010/main"/>
-              </a:ext>
-            </a:extLst>
-          </a:blip>
-          <a:stretch>
-            <a:fillRect/>
-          </a:stretch>
-        </p:blipFill>
-        <p:spPr>
-          <a:xfrm>
-            <a:off x="4876800" y="4153764"/>
-            <a:ext cx="4114800" cy="2243610"/>
-          </a:xfrm>
-          <a:prstGeom prst="rect">
-            <a:avLst/>
-          </a:prstGeom>
-        </p:spPr>
-      </p:pic>
-    </p:spTree>
-    <p:extLst>
-      <p:ext uri="{BB962C8B-B14F-4D97-AF65-F5344CB8AC3E}">
-        <p14:creationId xmlns:p14="http://schemas.microsoft.com/office/powerpoint/2010/main" val="2044767919"/>
-      </p:ext>
-    </p:extLst>
-  </p:cSld>
-  <p:clrMapOvr>
-    <a:masterClrMapping/>
-  </p:clrMapOvr>
-</p:sld>
-</file>
-
-<file path=ppt/slides/slide22.xml><?xml version="1.0" encoding="utf-8"?>
-<p:sld xmlns:a="http://schemas.openxmlformats.org/drawingml/2006/main" xmlns:r="http://schemas.openxmlformats.org/officeDocument/2006/relationships" xmlns:p="http://schemas.openxmlformats.org/presentationml/2006/main">
-  <p:cSld>
-    <p:spTree>
-      <p:nvGrpSpPr>
-        <p:cNvPr id="1" name=""/>
-        <p:cNvGrpSpPr/>
-        <p:nvPr/>
-      </p:nvGrpSpPr>
-      <p:grpSpPr>
-        <a:xfrm>
-          <a:off x="0" y="0"/>
-          <a:ext cx="0" cy="0"/>
-          <a:chOff x="0" y="0"/>
-          <a:chExt cx="0" cy="0"/>
-        </a:xfrm>
-      </p:grpSpPr>
-      <p:sp>
-        <p:nvSpPr>
-          <p:cNvPr id="17409" name="Rectangle 9"/>
-          <p:cNvSpPr>
-            <a:spLocks noChangeArrowheads="1"/>
-          </p:cNvSpPr>
-          <p:nvPr/>
-        </p:nvSpPr>
-        <p:spPr bwMode="auto">
-          <a:xfrm>
             <a:off x="693295" y="1676400"/>
             <a:ext cx="3886200" cy="830997"/>
           </a:xfrm>
@@ -13652,7 +13138,7 @@
 </p:sld>
 </file>
 
-<file path=ppt/slides/slide23.xml><?xml version="1.0" encoding="utf-8"?>
+<file path=ppt/slides/slide21.xml><?xml version="1.0" encoding="utf-8"?>
 <p:sld xmlns:a="http://schemas.openxmlformats.org/drawingml/2006/main" xmlns:r="http://schemas.openxmlformats.org/officeDocument/2006/relationships" xmlns:p="http://schemas.openxmlformats.org/presentationml/2006/main">
   <p:cSld>
     <p:spTree>
@@ -13800,6 +13286,66 @@
     <p:extLst>
       <p:ext uri="{BB962C8B-B14F-4D97-AF65-F5344CB8AC3E}">
         <p14:creationId xmlns:p14="http://schemas.microsoft.com/office/powerpoint/2010/main" val="3478572251"/>
+      </p:ext>
+    </p:extLst>
+  </p:cSld>
+  <p:clrMapOvr>
+    <a:masterClrMapping/>
+  </p:clrMapOvr>
+</p:sld>
+</file>
+
+<file path=ppt/slides/slide22.xml><?xml version="1.0" encoding="utf-8"?>
+<p:sld xmlns:a="http://schemas.openxmlformats.org/drawingml/2006/main" xmlns:r="http://schemas.openxmlformats.org/officeDocument/2006/relationships" xmlns:p="http://schemas.openxmlformats.org/presentationml/2006/main">
+  <p:cSld>
+    <p:spTree>
+      <p:nvGrpSpPr>
+        <p:cNvPr id="1" name=""/>
+        <p:cNvGrpSpPr/>
+        <p:nvPr/>
+      </p:nvGrpSpPr>
+      <p:grpSpPr>
+        <a:xfrm>
+          <a:off x="0" y="0"/>
+          <a:ext cx="0" cy="0"/>
+          <a:chOff x="0" y="0"/>
+          <a:chExt cx="0" cy="0"/>
+        </a:xfrm>
+      </p:grpSpPr>
+    </p:spTree>
+    <p:extLst>
+      <p:ext uri="{BB962C8B-B14F-4D97-AF65-F5344CB8AC3E}">
+        <p14:creationId xmlns:p14="http://schemas.microsoft.com/office/powerpoint/2010/main" val="516819814"/>
+      </p:ext>
+    </p:extLst>
+  </p:cSld>
+  <p:clrMapOvr>
+    <a:masterClrMapping/>
+  </p:clrMapOvr>
+</p:sld>
+</file>
+
+<file path=ppt/slides/slide23.xml><?xml version="1.0" encoding="utf-8"?>
+<p:sld xmlns:a="http://schemas.openxmlformats.org/drawingml/2006/main" xmlns:r="http://schemas.openxmlformats.org/officeDocument/2006/relationships" xmlns:p="http://schemas.openxmlformats.org/presentationml/2006/main">
+  <p:cSld>
+    <p:spTree>
+      <p:nvGrpSpPr>
+        <p:cNvPr id="1" name=""/>
+        <p:cNvGrpSpPr/>
+        <p:nvPr/>
+      </p:nvGrpSpPr>
+      <p:grpSpPr>
+        <a:xfrm>
+          <a:off x="0" y="0"/>
+          <a:ext cx="0" cy="0"/>
+          <a:chOff x="0" y="0"/>
+          <a:chExt cx="0" cy="0"/>
+        </a:xfrm>
+      </p:grpSpPr>
+    </p:spTree>
+    <p:extLst>
+      <p:ext uri="{BB962C8B-B14F-4D97-AF65-F5344CB8AC3E}">
+        <p14:creationId xmlns:p14="http://schemas.microsoft.com/office/powerpoint/2010/main" val="2753975283"/>
       </p:ext>
     </p:extLst>
   </p:cSld>

</xml_diff>